<commit_message>
schema update for base frequency module
</commit_message>
<xml_diff>
--- a/Plan/schema.pptx
+++ b/Plan/schema.pptx
@@ -11,6 +11,7 @@
     <p:sldId id="256" r:id="rId5"/>
     <p:sldId id="257" r:id="rId6"/>
     <p:sldId id="262" r:id="rId7"/>
+    <p:sldId id="263" r:id="rId8"/>
   </p:sldIdLst>
   <p:sldSz cx="12192000" cy="6858000"/>
   <p:notesSz cx="6858000" cy="9144000"/>
@@ -264,7 +265,7 @@
           <a:p>
             <a:fld id="{E1A2546D-C337-864E-97E4-436D2A8FC99A}" type="datetimeFigureOut">
               <a:rPr lang="en-US" smtClean="0"/>
-              <a:t>7/31/20</a:t>
+              <a:t>8/6/20</a:t>
             </a:fld>
             <a:endParaRPr lang="en-US"/>
           </a:p>
@@ -462,7 +463,7 @@
           <a:p>
             <a:fld id="{E1A2546D-C337-864E-97E4-436D2A8FC99A}" type="datetimeFigureOut">
               <a:rPr lang="en-US" smtClean="0"/>
-              <a:t>7/31/20</a:t>
+              <a:t>8/6/20</a:t>
             </a:fld>
             <a:endParaRPr lang="en-US"/>
           </a:p>
@@ -670,7 +671,7 @@
           <a:p>
             <a:fld id="{E1A2546D-C337-864E-97E4-436D2A8FC99A}" type="datetimeFigureOut">
               <a:rPr lang="en-US" smtClean="0"/>
-              <a:t>7/31/20</a:t>
+              <a:t>8/6/20</a:t>
             </a:fld>
             <a:endParaRPr lang="en-US"/>
           </a:p>
@@ -868,7 +869,7 @@
           <a:p>
             <a:fld id="{E1A2546D-C337-864E-97E4-436D2A8FC99A}" type="datetimeFigureOut">
               <a:rPr lang="en-US" smtClean="0"/>
-              <a:t>7/31/20</a:t>
+              <a:t>8/6/20</a:t>
             </a:fld>
             <a:endParaRPr lang="en-US"/>
           </a:p>
@@ -1143,7 +1144,7 @@
           <a:p>
             <a:fld id="{E1A2546D-C337-864E-97E4-436D2A8FC99A}" type="datetimeFigureOut">
               <a:rPr lang="en-US" smtClean="0"/>
-              <a:t>7/31/20</a:t>
+              <a:t>8/6/20</a:t>
             </a:fld>
             <a:endParaRPr lang="en-US"/>
           </a:p>
@@ -1408,7 +1409,7 @@
           <a:p>
             <a:fld id="{E1A2546D-C337-864E-97E4-436D2A8FC99A}" type="datetimeFigureOut">
               <a:rPr lang="en-US" smtClean="0"/>
-              <a:t>7/31/20</a:t>
+              <a:t>8/6/20</a:t>
             </a:fld>
             <a:endParaRPr lang="en-US"/>
           </a:p>
@@ -1820,7 +1821,7 @@
           <a:p>
             <a:fld id="{E1A2546D-C337-864E-97E4-436D2A8FC99A}" type="datetimeFigureOut">
               <a:rPr lang="en-US" smtClean="0"/>
-              <a:t>7/31/20</a:t>
+              <a:t>8/6/20</a:t>
             </a:fld>
             <a:endParaRPr lang="en-US"/>
           </a:p>
@@ -1961,7 +1962,7 @@
           <a:p>
             <a:fld id="{E1A2546D-C337-864E-97E4-436D2A8FC99A}" type="datetimeFigureOut">
               <a:rPr lang="en-US" smtClean="0"/>
-              <a:t>7/31/20</a:t>
+              <a:t>8/6/20</a:t>
             </a:fld>
             <a:endParaRPr lang="en-US"/>
           </a:p>
@@ -2074,7 +2075,7 @@
           <a:p>
             <a:fld id="{E1A2546D-C337-864E-97E4-436D2A8FC99A}" type="datetimeFigureOut">
               <a:rPr lang="en-US" smtClean="0"/>
-              <a:t>7/31/20</a:t>
+              <a:t>8/6/20</a:t>
             </a:fld>
             <a:endParaRPr lang="en-US"/>
           </a:p>
@@ -2385,7 +2386,7 @@
           <a:p>
             <a:fld id="{E1A2546D-C337-864E-97E4-436D2A8FC99A}" type="datetimeFigureOut">
               <a:rPr lang="en-US" smtClean="0"/>
-              <a:t>7/31/20</a:t>
+              <a:t>8/6/20</a:t>
             </a:fld>
             <a:endParaRPr lang="en-US"/>
           </a:p>
@@ -2673,7 +2674,7 @@
           <a:p>
             <a:fld id="{E1A2546D-C337-864E-97E4-436D2A8FC99A}" type="datetimeFigureOut">
               <a:rPr lang="en-US" smtClean="0"/>
-              <a:t>7/31/20</a:t>
+              <a:t>8/6/20</a:t>
             </a:fld>
             <a:endParaRPr lang="en-US"/>
           </a:p>
@@ -2914,7 +2915,7 @@
           <a:p>
             <a:fld id="{E1A2546D-C337-864E-97E4-436D2A8FC99A}" type="datetimeFigureOut">
               <a:rPr lang="en-US" smtClean="0"/>
-              <a:t>7/31/20</a:t>
+              <a:t>8/6/20</a:t>
             </a:fld>
             <a:endParaRPr lang="en-US"/>
           </a:p>
@@ -4291,7 +4292,7 @@
         </p:nvSpPr>
         <p:spPr>
           <a:xfrm>
-            <a:off x="3677791" y="2404865"/>
+            <a:off x="3677791" y="1830357"/>
             <a:ext cx="1969325" cy="365259"/>
           </a:xfrm>
           <a:prstGeom prst="roundRect">
@@ -4346,8 +4347,8 @@
         </p:nvSpPr>
         <p:spPr>
           <a:xfrm>
-            <a:off x="3677791" y="1863007"/>
-            <a:ext cx="1969325" cy="365259"/>
+            <a:off x="4900535" y="2429818"/>
+            <a:ext cx="1790295" cy="365259"/>
           </a:xfrm>
           <a:prstGeom prst="roundRect">
             <a:avLst/>
@@ -4375,14 +4376,7 @@
             <a:pPr algn="ctr"/>
             <a:r>
               <a:rPr lang="en-US" sz="1200" dirty="0"/>
-              <a:t>*Nucleotide base frequency</a:t>
-            </a:r>
-          </a:p>
-          <a:p>
-            <a:pPr algn="ctr"/>
-            <a:r>
-              <a:rPr lang="en-US" sz="1200" dirty="0"/>
-              <a:t>at 5’-ends of reads</a:t>
+              <a:t>Nucleotide base frequency at frag. ends</a:t>
             </a:r>
           </a:p>
         </p:txBody>
@@ -4398,17 +4392,17 @@
           </p:cNvPr>
           <p:cNvCxnSpPr>
             <a:cxnSpLocks/>
-            <a:stCxn id="16" idx="3"/>
+            <a:stCxn id="12" idx="2"/>
             <a:endCxn id="33" idx="1"/>
           </p:cNvCxnSpPr>
           <p:nvPr/>
         </p:nvCxnSpPr>
         <p:spPr>
-          <a:xfrm flipV="1">
-            <a:off x="3117176" y="2045637"/>
-            <a:ext cx="560615" cy="2560202"/>
-          </a:xfrm>
-          <a:prstGeom prst="bentConnector3">
+          <a:xfrm rot="16200000" flipH="1">
+            <a:off x="4573078" y="2284991"/>
+            <a:ext cx="416832" cy="238081"/>
+          </a:xfrm>
+          <a:prstGeom prst="bentConnector2">
             <a:avLst/>
           </a:prstGeom>
           <a:ln>
@@ -4448,8 +4442,8 @@
         </p:nvCxnSpPr>
         <p:spPr>
           <a:xfrm flipV="1">
-            <a:off x="3117176" y="2587495"/>
-            <a:ext cx="560615" cy="2018344"/>
+            <a:off x="3117176" y="2012987"/>
+            <a:ext cx="560615" cy="2592852"/>
           </a:xfrm>
           <a:prstGeom prst="bentConnector3">
             <a:avLst>
@@ -4793,8 +4787,8 @@
         </p:nvCxnSpPr>
         <p:spPr>
           <a:xfrm rot="16200000" flipH="1">
-            <a:off x="4344188" y="3088390"/>
-            <a:ext cx="874617" cy="238084"/>
+            <a:off x="4056934" y="2801136"/>
+            <a:ext cx="1449125" cy="238084"/>
           </a:xfrm>
           <a:prstGeom prst="bentConnector2">
             <a:avLst/>
@@ -4836,8 +4830,8 @@
         </p:nvCxnSpPr>
         <p:spPr>
           <a:xfrm rot="16200000" flipH="1">
-            <a:off x="4101373" y="3331205"/>
-            <a:ext cx="1360246" cy="238084"/>
+            <a:off x="3814119" y="3043951"/>
+            <a:ext cx="1934754" cy="238084"/>
           </a:xfrm>
           <a:prstGeom prst="bentConnector2">
             <a:avLst/>
@@ -4879,8 +4873,8 @@
         </p:nvCxnSpPr>
         <p:spPr>
           <a:xfrm rot="16200000" flipH="1">
-            <a:off x="3853742" y="3578835"/>
-            <a:ext cx="1855507" cy="238083"/>
+            <a:off x="3566488" y="3291581"/>
+            <a:ext cx="2430015" cy="238083"/>
           </a:xfrm>
           <a:prstGeom prst="bentConnector2">
             <a:avLst/>
@@ -4922,8 +4916,8 @@
         </p:nvCxnSpPr>
         <p:spPr>
           <a:xfrm rot="16200000" flipH="1">
-            <a:off x="3350383" y="4082195"/>
-            <a:ext cx="2862225" cy="238082"/>
+            <a:off x="3063129" y="3794941"/>
+            <a:ext cx="3436733" cy="238082"/>
           </a:xfrm>
           <a:prstGeom prst="bentConnector2">
             <a:avLst/>
@@ -4947,41 +4941,6 @@
           </a:fontRef>
         </p:style>
       </p:cxnSp>
-      <p:sp>
-        <p:nvSpPr>
-          <p:cNvPr id="63" name="TextBox 62">
-            <a:extLst>
-              <a:ext uri="{FF2B5EF4-FFF2-40B4-BE49-F238E27FC236}">
-                <a16:creationId xmlns:a16="http://schemas.microsoft.com/office/drawing/2014/main" id="{3B6D663B-A05A-A647-88EA-BC162F5E9E27}"/>
-              </a:ext>
-            </a:extLst>
-          </p:cNvPr>
-          <p:cNvSpPr txBox="1"/>
-          <p:nvPr/>
-        </p:nvSpPr>
-        <p:spPr>
-          <a:xfrm>
-            <a:off x="5770634" y="1898052"/>
-            <a:ext cx="3879845" cy="276999"/>
-          </a:xfrm>
-          <a:prstGeom prst="rect">
-            <a:avLst/>
-          </a:prstGeom>
-          <a:noFill/>
-        </p:spPr>
-        <p:txBody>
-          <a:bodyPr wrap="none" rtlCol="0">
-            <a:spAutoFit/>
-          </a:bodyPr>
-          <a:lstStyle/>
-          <a:p>
-            <a:r>
-              <a:rPr lang="en-US" sz="1200" dirty="0"/>
-              <a:t>*planned to move downstream below fragment generation</a:t>
-            </a:r>
-          </a:p>
-        </p:txBody>
-      </p:sp>
       <p:cxnSp>
         <p:nvCxnSpPr>
           <p:cNvPr id="69" name="Straight Arrow Connector 68">
@@ -5144,8 +5103,8 @@
         </p:nvCxnSpPr>
         <p:spPr>
           <a:xfrm rot="16200000" flipH="1">
-            <a:off x="3602061" y="3830516"/>
-            <a:ext cx="2358866" cy="238081"/>
+            <a:off x="3314807" y="3543262"/>
+            <a:ext cx="2933374" cy="238081"/>
           </a:xfrm>
           <a:prstGeom prst="bentConnector2">
             <a:avLst/>
@@ -5187,8 +5146,8 @@
         </p:nvCxnSpPr>
         <p:spPr>
           <a:xfrm rot="16200000" flipH="1">
-            <a:off x="4595772" y="2836806"/>
-            <a:ext cx="371448" cy="238084"/>
+            <a:off x="4308518" y="2549552"/>
+            <a:ext cx="945956" cy="238084"/>
           </a:xfrm>
           <a:prstGeom prst="bentConnector2">
             <a:avLst/>
@@ -6344,10 +6303,10 @@
       </p:grpSpPr>
       <p:sp>
         <p:nvSpPr>
-          <p:cNvPr id="2" name="Title 1">
-            <a:extLst>
-              <a:ext uri="{FF2B5EF4-FFF2-40B4-BE49-F238E27FC236}">
-                <a16:creationId xmlns:a16="http://schemas.microsoft.com/office/drawing/2014/main" id="{D20B8484-315E-3F4E-BC16-8E1FACD2892A}"/>
+          <p:cNvPr id="4" name="Title 3">
+            <a:extLst>
+              <a:ext uri="{FF2B5EF4-FFF2-40B4-BE49-F238E27FC236}">
+                <a16:creationId xmlns:a16="http://schemas.microsoft.com/office/drawing/2014/main" id="{5C53D689-9AD5-654A-84B8-9EEDB644EFDE}"/>
               </a:ext>
             </a:extLst>
           </p:cNvPr>
@@ -6363,16 +6322,16 @@
           <a:bodyPr/>
           <a:lstStyle/>
           <a:p>
-            <a:endParaRPr lang="en-US" dirty="0"/>
-          </a:p>
-        </p:txBody>
-      </p:sp>
-      <p:sp>
-        <p:nvSpPr>
-          <p:cNvPr id="3" name="Content Placeholder 2">
-            <a:extLst>
-              <a:ext uri="{FF2B5EF4-FFF2-40B4-BE49-F238E27FC236}">
-                <a16:creationId xmlns:a16="http://schemas.microsoft.com/office/drawing/2014/main" id="{410B95BE-D594-C947-900D-D12FE954DC41}"/>
+            <a:endParaRPr lang="en-US"/>
+          </a:p>
+        </p:txBody>
+      </p:sp>
+      <p:sp>
+        <p:nvSpPr>
+          <p:cNvPr id="5" name="Text Placeholder 4">
+            <a:extLst>
+              <a:ext uri="{FF2B5EF4-FFF2-40B4-BE49-F238E27FC236}">
+                <a16:creationId xmlns:a16="http://schemas.microsoft.com/office/drawing/2014/main" id="{7FA8E3FA-6E27-CA47-A74E-A6B2FE72BA0F}"/>
               </a:ext>
             </a:extLst>
           </p:cNvPr>
@@ -6380,7 +6339,7 @@
             <a:spLocks noGrp="1"/>
           </p:cNvSpPr>
           <p:nvPr>
-            <p:ph idx="1"/>
+            <p:ph type="body" idx="1"/>
           </p:nvPr>
         </p:nvSpPr>
         <p:spPr/>
@@ -6388,7 +6347,10 @@
           <a:bodyPr/>
           <a:lstStyle/>
           <a:p>
-            <a:endParaRPr lang="en-US" dirty="0"/>
+            <a:r>
+              <a:rPr lang="en-US" dirty="0"/>
+              <a:t>previous version</a:t>
+            </a:r>
           </a:p>
         </p:txBody>
       </p:sp>
@@ -6396,6 +6358,1732 @@
     <p:extLst>
       <p:ext uri="{BB962C8B-B14F-4D97-AF65-F5344CB8AC3E}">
         <p14:creationId xmlns:p14="http://schemas.microsoft.com/office/powerpoint/2010/main" val="1900252905"/>
+      </p:ext>
+    </p:extLst>
+  </p:cSld>
+  <p:clrMapOvr>
+    <a:masterClrMapping/>
+  </p:clrMapOvr>
+</p:sld>
+</file>
+
+<file path=ppt/slides/slide7.xml><?xml version="1.0" encoding="utf-8"?>
+<p:sld xmlns:a="http://schemas.openxmlformats.org/drawingml/2006/main" xmlns:r="http://schemas.openxmlformats.org/officeDocument/2006/relationships" xmlns:p="http://schemas.openxmlformats.org/presentationml/2006/main">
+  <p:cSld>
+    <p:spTree>
+      <p:nvGrpSpPr>
+        <p:cNvPr id="1" name=""/>
+        <p:cNvGrpSpPr/>
+        <p:nvPr/>
+      </p:nvGrpSpPr>
+      <p:grpSpPr>
+        <a:xfrm>
+          <a:off x="0" y="0"/>
+          <a:ext cx="0" cy="0"/>
+          <a:chOff x="0" y="0"/>
+          <a:chExt cx="0" cy="0"/>
+        </a:xfrm>
+      </p:grpSpPr>
+      <p:sp>
+        <p:nvSpPr>
+          <p:cNvPr id="13" name="Down Arrow 12">
+            <a:extLst>
+              <a:ext uri="{FF2B5EF4-FFF2-40B4-BE49-F238E27FC236}">
+                <a16:creationId xmlns:a16="http://schemas.microsoft.com/office/drawing/2014/main" id="{29D41109-E348-9648-B36A-D5AF1498CB45}"/>
+              </a:ext>
+            </a:extLst>
+          </p:cNvPr>
+          <p:cNvSpPr/>
+          <p:nvPr/>
+        </p:nvSpPr>
+        <p:spPr>
+          <a:xfrm>
+            <a:off x="1865319" y="1427305"/>
+            <a:ext cx="642257" cy="2940239"/>
+          </a:xfrm>
+          <a:prstGeom prst="downArrow">
+            <a:avLst/>
+          </a:prstGeom>
+          <a:solidFill>
+            <a:schemeClr val="bg1">
+              <a:lumMod val="75000"/>
+            </a:schemeClr>
+          </a:solidFill>
+          <a:ln>
+            <a:noFill/>
+          </a:ln>
+        </p:spPr>
+        <p:style>
+          <a:lnRef idx="2">
+            <a:schemeClr val="accent1">
+              <a:shade val="50000"/>
+            </a:schemeClr>
+          </a:lnRef>
+          <a:fillRef idx="1">
+            <a:schemeClr val="accent1"/>
+          </a:fillRef>
+          <a:effectRef idx="0">
+            <a:schemeClr val="accent1"/>
+          </a:effectRef>
+          <a:fontRef idx="minor">
+            <a:schemeClr val="lt1"/>
+          </a:fontRef>
+        </p:style>
+        <p:txBody>
+          <a:bodyPr rtlCol="0" anchor="ctr"/>
+          <a:lstStyle/>
+          <a:p>
+            <a:pPr algn="ctr"/>
+            <a:endParaRPr lang="en-US"/>
+          </a:p>
+        </p:txBody>
+      </p:sp>
+      <p:sp>
+        <p:nvSpPr>
+          <p:cNvPr id="2" name="Rounded Rectangle 1">
+            <a:extLst>
+              <a:ext uri="{FF2B5EF4-FFF2-40B4-BE49-F238E27FC236}">
+                <a16:creationId xmlns:a16="http://schemas.microsoft.com/office/drawing/2014/main" id="{DC796C03-4AD6-2341-ABE2-6195814B7A0F}"/>
+              </a:ext>
+            </a:extLst>
+          </p:cNvPr>
+          <p:cNvSpPr/>
+          <p:nvPr/>
+        </p:nvSpPr>
+        <p:spPr>
+          <a:xfrm>
+            <a:off x="1353690" y="1253134"/>
+            <a:ext cx="1763486" cy="429925"/>
+          </a:xfrm>
+          <a:prstGeom prst="roundRect">
+            <a:avLst/>
+          </a:prstGeom>
+        </p:spPr>
+        <p:style>
+          <a:lnRef idx="2">
+            <a:schemeClr val="accent1">
+              <a:shade val="50000"/>
+            </a:schemeClr>
+          </a:lnRef>
+          <a:fillRef idx="1">
+            <a:schemeClr val="accent1"/>
+          </a:fillRef>
+          <a:effectRef idx="0">
+            <a:schemeClr val="accent1"/>
+          </a:effectRef>
+          <a:fontRef idx="minor">
+            <a:schemeClr val="lt1"/>
+          </a:fontRef>
+        </p:style>
+        <p:txBody>
+          <a:bodyPr rtlCol="0" anchor="ctr"/>
+          <a:lstStyle/>
+          <a:p>
+            <a:pPr algn="ctr"/>
+            <a:r>
+              <a:rPr lang="en-US" sz="1600" dirty="0" err="1"/>
+              <a:t>Fastq</a:t>
+            </a:r>
+            <a:endParaRPr lang="en-US" sz="1600" dirty="0"/>
+          </a:p>
+        </p:txBody>
+      </p:sp>
+      <p:sp>
+        <p:nvSpPr>
+          <p:cNvPr id="6" name="Rectangle 5">
+            <a:extLst>
+              <a:ext uri="{FF2B5EF4-FFF2-40B4-BE49-F238E27FC236}">
+                <a16:creationId xmlns:a16="http://schemas.microsoft.com/office/drawing/2014/main" id="{DDD14D0E-C085-FE4B-B881-F1F43870D1B5}"/>
+              </a:ext>
+            </a:extLst>
+          </p:cNvPr>
+          <p:cNvSpPr/>
+          <p:nvPr/>
+        </p:nvSpPr>
+        <p:spPr>
+          <a:xfrm>
+            <a:off x="1353690" y="1876016"/>
+            <a:ext cx="1763486" cy="429925"/>
+          </a:xfrm>
+          <a:prstGeom prst="rect">
+            <a:avLst/>
+          </a:prstGeom>
+        </p:spPr>
+        <p:style>
+          <a:lnRef idx="2">
+            <a:schemeClr val="accent1">
+              <a:shade val="50000"/>
+            </a:schemeClr>
+          </a:lnRef>
+          <a:fillRef idx="1">
+            <a:schemeClr val="accent1"/>
+          </a:fillRef>
+          <a:effectRef idx="0">
+            <a:schemeClr val="accent1"/>
+          </a:effectRef>
+          <a:fontRef idx="minor">
+            <a:schemeClr val="lt1"/>
+          </a:fontRef>
+        </p:style>
+        <p:txBody>
+          <a:bodyPr rtlCol="0" anchor="ctr"/>
+          <a:lstStyle/>
+          <a:p>
+            <a:pPr algn="ctr"/>
+            <a:r>
+              <a:rPr lang="en-US" sz="1600" dirty="0"/>
+              <a:t>Adapter trimming</a:t>
+            </a:r>
+          </a:p>
+        </p:txBody>
+      </p:sp>
+      <p:sp>
+        <p:nvSpPr>
+          <p:cNvPr id="8" name="Rectangle 7">
+            <a:extLst>
+              <a:ext uri="{FF2B5EF4-FFF2-40B4-BE49-F238E27FC236}">
+                <a16:creationId xmlns:a16="http://schemas.microsoft.com/office/drawing/2014/main" id="{4712950F-06F1-3C42-959D-3DF59017BB2A}"/>
+              </a:ext>
+            </a:extLst>
+          </p:cNvPr>
+          <p:cNvSpPr/>
+          <p:nvPr/>
+        </p:nvSpPr>
+        <p:spPr>
+          <a:xfrm>
+            <a:off x="1353690" y="2498898"/>
+            <a:ext cx="1763486" cy="429925"/>
+          </a:xfrm>
+          <a:prstGeom prst="rect">
+            <a:avLst/>
+          </a:prstGeom>
+        </p:spPr>
+        <p:style>
+          <a:lnRef idx="2">
+            <a:schemeClr val="accent1">
+              <a:shade val="50000"/>
+            </a:schemeClr>
+          </a:lnRef>
+          <a:fillRef idx="1">
+            <a:schemeClr val="accent1"/>
+          </a:fillRef>
+          <a:effectRef idx="0">
+            <a:schemeClr val="accent1"/>
+          </a:effectRef>
+          <a:fontRef idx="minor">
+            <a:schemeClr val="lt1"/>
+          </a:fontRef>
+        </p:style>
+        <p:txBody>
+          <a:bodyPr rtlCol="0" anchor="ctr"/>
+          <a:lstStyle/>
+          <a:p>
+            <a:pPr algn="ctr"/>
+            <a:r>
+              <a:rPr lang="en-US" sz="1600" dirty="0"/>
+              <a:t>Alignment</a:t>
+            </a:r>
+          </a:p>
+        </p:txBody>
+      </p:sp>
+      <p:sp>
+        <p:nvSpPr>
+          <p:cNvPr id="9" name="Rectangle 8">
+            <a:extLst>
+              <a:ext uri="{FF2B5EF4-FFF2-40B4-BE49-F238E27FC236}">
+                <a16:creationId xmlns:a16="http://schemas.microsoft.com/office/drawing/2014/main" id="{9C704494-A68D-DE4E-BCA2-21E5C34913DA}"/>
+              </a:ext>
+            </a:extLst>
+          </p:cNvPr>
+          <p:cNvSpPr/>
+          <p:nvPr/>
+        </p:nvSpPr>
+        <p:spPr>
+          <a:xfrm>
+            <a:off x="1353690" y="3121780"/>
+            <a:ext cx="1763486" cy="429925"/>
+          </a:xfrm>
+          <a:prstGeom prst="rect">
+            <a:avLst/>
+          </a:prstGeom>
+        </p:spPr>
+        <p:style>
+          <a:lnRef idx="2">
+            <a:schemeClr val="accent1">
+              <a:shade val="50000"/>
+            </a:schemeClr>
+          </a:lnRef>
+          <a:fillRef idx="1">
+            <a:schemeClr val="accent1"/>
+          </a:fillRef>
+          <a:effectRef idx="0">
+            <a:schemeClr val="accent1"/>
+          </a:effectRef>
+          <a:fontRef idx="minor">
+            <a:schemeClr val="lt1"/>
+          </a:fontRef>
+        </p:style>
+        <p:txBody>
+          <a:bodyPr rtlCol="0" anchor="ctr"/>
+          <a:lstStyle/>
+          <a:p>
+            <a:pPr algn="ctr"/>
+            <a:r>
+              <a:rPr lang="en-US" sz="1600" dirty="0"/>
+              <a:t>Filtering</a:t>
+            </a:r>
+          </a:p>
+        </p:txBody>
+      </p:sp>
+      <p:sp>
+        <p:nvSpPr>
+          <p:cNvPr id="10" name="Rectangle 9">
+            <a:extLst>
+              <a:ext uri="{FF2B5EF4-FFF2-40B4-BE49-F238E27FC236}">
+                <a16:creationId xmlns:a16="http://schemas.microsoft.com/office/drawing/2014/main" id="{24659264-2055-7E4A-940E-CC1AE876CF13}"/>
+              </a:ext>
+            </a:extLst>
+          </p:cNvPr>
+          <p:cNvSpPr/>
+          <p:nvPr/>
+        </p:nvSpPr>
+        <p:spPr>
+          <a:xfrm>
+            <a:off x="1353690" y="3744662"/>
+            <a:ext cx="1763486" cy="429925"/>
+          </a:xfrm>
+          <a:prstGeom prst="rect">
+            <a:avLst/>
+          </a:prstGeom>
+          <a:solidFill>
+            <a:schemeClr val="accent1">
+              <a:lumMod val="40000"/>
+              <a:lumOff val="60000"/>
+            </a:schemeClr>
+          </a:solidFill>
+        </p:spPr>
+        <p:style>
+          <a:lnRef idx="2">
+            <a:schemeClr val="accent1">
+              <a:shade val="50000"/>
+            </a:schemeClr>
+          </a:lnRef>
+          <a:fillRef idx="1">
+            <a:schemeClr val="accent1"/>
+          </a:fillRef>
+          <a:effectRef idx="0">
+            <a:schemeClr val="accent1"/>
+          </a:effectRef>
+          <a:fontRef idx="minor">
+            <a:schemeClr val="lt1"/>
+          </a:fontRef>
+        </p:style>
+        <p:txBody>
+          <a:bodyPr rtlCol="0" anchor="ctr"/>
+          <a:lstStyle/>
+          <a:p>
+            <a:pPr algn="ctr"/>
+            <a:r>
+              <a:rPr lang="en-US" sz="1600" dirty="0"/>
+              <a:t>Deduplication </a:t>
+            </a:r>
+            <a:r>
+              <a:rPr lang="en-US" sz="1400" dirty="0"/>
+              <a:t>(optional)</a:t>
+            </a:r>
+          </a:p>
+        </p:txBody>
+      </p:sp>
+      <p:sp>
+        <p:nvSpPr>
+          <p:cNvPr id="15" name="TextBox 14">
+            <a:extLst>
+              <a:ext uri="{FF2B5EF4-FFF2-40B4-BE49-F238E27FC236}">
+                <a16:creationId xmlns:a16="http://schemas.microsoft.com/office/drawing/2014/main" id="{53BB6745-9937-664C-8D49-4D327DFB336E}"/>
+              </a:ext>
+            </a:extLst>
+          </p:cNvPr>
+          <p:cNvSpPr txBox="1"/>
+          <p:nvPr/>
+        </p:nvSpPr>
+        <p:spPr>
+          <a:xfrm>
+            <a:off x="318454" y="221196"/>
+            <a:ext cx="2849819" cy="400110"/>
+          </a:xfrm>
+          <a:prstGeom prst="rect">
+            <a:avLst/>
+          </a:prstGeom>
+          <a:noFill/>
+        </p:spPr>
+        <p:txBody>
+          <a:bodyPr wrap="none" rtlCol="0">
+            <a:spAutoFit/>
+          </a:bodyPr>
+          <a:lstStyle/>
+          <a:p>
+            <a:r>
+              <a:rPr lang="en-US" sz="2000" b="1" dirty="0"/>
+              <a:t>Current status of Cutlery</a:t>
+            </a:r>
+          </a:p>
+        </p:txBody>
+      </p:sp>
+      <p:sp>
+        <p:nvSpPr>
+          <p:cNvPr id="16" name="Rounded Rectangle 15">
+            <a:extLst>
+              <a:ext uri="{FF2B5EF4-FFF2-40B4-BE49-F238E27FC236}">
+                <a16:creationId xmlns:a16="http://schemas.microsoft.com/office/drawing/2014/main" id="{94DA1DF1-187C-9B45-A37F-29C99D68EC4C}"/>
+              </a:ext>
+            </a:extLst>
+          </p:cNvPr>
+          <p:cNvSpPr/>
+          <p:nvPr/>
+        </p:nvSpPr>
+        <p:spPr>
+          <a:xfrm>
+            <a:off x="1353690" y="4390876"/>
+            <a:ext cx="1763486" cy="429925"/>
+          </a:xfrm>
+          <a:prstGeom prst="roundRect">
+            <a:avLst/>
+          </a:prstGeom>
+        </p:spPr>
+        <p:style>
+          <a:lnRef idx="2">
+            <a:schemeClr val="accent1">
+              <a:shade val="50000"/>
+            </a:schemeClr>
+          </a:lnRef>
+          <a:fillRef idx="1">
+            <a:schemeClr val="accent1"/>
+          </a:fillRef>
+          <a:effectRef idx="0">
+            <a:schemeClr val="accent1"/>
+          </a:effectRef>
+          <a:fontRef idx="minor">
+            <a:schemeClr val="lt1"/>
+          </a:fontRef>
+        </p:style>
+        <p:txBody>
+          <a:bodyPr rtlCol="0" anchor="ctr"/>
+          <a:lstStyle/>
+          <a:p>
+            <a:pPr algn="ctr"/>
+            <a:r>
+              <a:rPr lang="en-US" sz="1600" dirty="0"/>
+              <a:t>Processed BAM</a:t>
+            </a:r>
+          </a:p>
+        </p:txBody>
+      </p:sp>
+      <p:sp>
+        <p:nvSpPr>
+          <p:cNvPr id="12" name="Rounded Rectangle 11">
+            <a:extLst>
+              <a:ext uri="{FF2B5EF4-FFF2-40B4-BE49-F238E27FC236}">
+                <a16:creationId xmlns:a16="http://schemas.microsoft.com/office/drawing/2014/main" id="{C636F5E8-01EE-DA4F-8B2C-6DE5FD254760}"/>
+              </a:ext>
+            </a:extLst>
+          </p:cNvPr>
+          <p:cNvSpPr/>
+          <p:nvPr/>
+        </p:nvSpPr>
+        <p:spPr>
+          <a:xfrm>
+            <a:off x="3677791" y="2404865"/>
+            <a:ext cx="1969325" cy="365259"/>
+          </a:xfrm>
+          <a:prstGeom prst="roundRect">
+            <a:avLst/>
+          </a:prstGeom>
+          <a:ln w="12700"/>
+        </p:spPr>
+        <p:style>
+          <a:lnRef idx="2">
+            <a:schemeClr val="dk1"/>
+          </a:lnRef>
+          <a:fillRef idx="1">
+            <a:schemeClr val="lt1"/>
+          </a:fillRef>
+          <a:effectRef idx="0">
+            <a:schemeClr val="dk1"/>
+          </a:effectRef>
+          <a:fontRef idx="minor">
+            <a:schemeClr val="dk1"/>
+          </a:fontRef>
+        </p:style>
+        <p:txBody>
+          <a:bodyPr rtlCol="0" anchor="ctr"/>
+          <a:lstStyle/>
+          <a:p>
+            <a:pPr algn="ctr"/>
+            <a:r>
+              <a:rPr lang="en-US" sz="1200" dirty="0"/>
+              <a:t>Fragment groups</a:t>
+            </a:r>
+          </a:p>
+          <a:p>
+            <a:pPr algn="ctr"/>
+            <a:r>
+              <a:rPr lang="en-US" sz="1200" dirty="0"/>
+              <a:t>NFR/NUC/all</a:t>
+            </a:r>
+          </a:p>
+        </p:txBody>
+      </p:sp>
+      <p:sp>
+        <p:nvSpPr>
+          <p:cNvPr id="33" name="Rounded Rectangle 32">
+            <a:extLst>
+              <a:ext uri="{FF2B5EF4-FFF2-40B4-BE49-F238E27FC236}">
+                <a16:creationId xmlns:a16="http://schemas.microsoft.com/office/drawing/2014/main" id="{A74FD820-3E35-A348-AD45-2B74B4368DF9}"/>
+              </a:ext>
+            </a:extLst>
+          </p:cNvPr>
+          <p:cNvSpPr/>
+          <p:nvPr/>
+        </p:nvSpPr>
+        <p:spPr>
+          <a:xfrm>
+            <a:off x="3677791" y="1863007"/>
+            <a:ext cx="1969325" cy="365259"/>
+          </a:xfrm>
+          <a:prstGeom prst="roundRect">
+            <a:avLst/>
+          </a:prstGeom>
+          <a:ln w="12700"/>
+        </p:spPr>
+        <p:style>
+          <a:lnRef idx="2">
+            <a:schemeClr val="dk1"/>
+          </a:lnRef>
+          <a:fillRef idx="1">
+            <a:schemeClr val="lt1"/>
+          </a:fillRef>
+          <a:effectRef idx="0">
+            <a:schemeClr val="dk1"/>
+          </a:effectRef>
+          <a:fontRef idx="minor">
+            <a:schemeClr val="dk1"/>
+          </a:fontRef>
+        </p:style>
+        <p:txBody>
+          <a:bodyPr rtlCol="0" anchor="ctr"/>
+          <a:lstStyle/>
+          <a:p>
+            <a:pPr algn="ctr"/>
+            <a:r>
+              <a:rPr lang="en-US" sz="1200" dirty="0"/>
+              <a:t>*Nucleotide base frequency</a:t>
+            </a:r>
+          </a:p>
+          <a:p>
+            <a:pPr algn="ctr"/>
+            <a:r>
+              <a:rPr lang="en-US" sz="1200" dirty="0"/>
+              <a:t>at 5’-ends of reads</a:t>
+            </a:r>
+          </a:p>
+        </p:txBody>
+      </p:sp>
+      <p:cxnSp>
+        <p:nvCxnSpPr>
+          <p:cNvPr id="35" name="Elbow Connector 34">
+            <a:extLst>
+              <a:ext uri="{FF2B5EF4-FFF2-40B4-BE49-F238E27FC236}">
+                <a16:creationId xmlns:a16="http://schemas.microsoft.com/office/drawing/2014/main" id="{90B62CFA-C649-834A-9B96-C3BE2178FF0C}"/>
+              </a:ext>
+            </a:extLst>
+          </p:cNvPr>
+          <p:cNvCxnSpPr>
+            <a:cxnSpLocks/>
+            <a:stCxn id="16" idx="3"/>
+            <a:endCxn id="33" idx="1"/>
+          </p:cNvCxnSpPr>
+          <p:nvPr/>
+        </p:nvCxnSpPr>
+        <p:spPr>
+          <a:xfrm flipV="1">
+            <a:off x="3117176" y="2045637"/>
+            <a:ext cx="560615" cy="2560202"/>
+          </a:xfrm>
+          <a:prstGeom prst="bentConnector3">
+            <a:avLst/>
+          </a:prstGeom>
+          <a:ln>
+            <a:tailEnd type="triangle"/>
+          </a:ln>
+        </p:spPr>
+        <p:style>
+          <a:lnRef idx="1">
+            <a:schemeClr val="accent1"/>
+          </a:lnRef>
+          <a:fillRef idx="0">
+            <a:schemeClr val="accent1"/>
+          </a:fillRef>
+          <a:effectRef idx="0">
+            <a:schemeClr val="accent1"/>
+          </a:effectRef>
+          <a:fontRef idx="minor">
+            <a:schemeClr val="tx1"/>
+          </a:fontRef>
+        </p:style>
+      </p:cxnSp>
+      <p:cxnSp>
+        <p:nvCxnSpPr>
+          <p:cNvPr id="37" name="Elbow Connector 36">
+            <a:extLst>
+              <a:ext uri="{FF2B5EF4-FFF2-40B4-BE49-F238E27FC236}">
+                <a16:creationId xmlns:a16="http://schemas.microsoft.com/office/drawing/2014/main" id="{064CCD20-D52F-2A42-89D6-9B12024436B8}"/>
+              </a:ext>
+            </a:extLst>
+          </p:cNvPr>
+          <p:cNvCxnSpPr>
+            <a:cxnSpLocks/>
+            <a:stCxn id="16" idx="3"/>
+            <a:endCxn id="12" idx="1"/>
+          </p:cNvCxnSpPr>
+          <p:nvPr/>
+        </p:nvCxnSpPr>
+        <p:spPr>
+          <a:xfrm flipV="1">
+            <a:off x="3117176" y="2587495"/>
+            <a:ext cx="560615" cy="2018344"/>
+          </a:xfrm>
+          <a:prstGeom prst="bentConnector3">
+            <a:avLst>
+              <a:gd name="adj1" fmla="val 50000"/>
+            </a:avLst>
+          </a:prstGeom>
+          <a:ln>
+            <a:tailEnd type="triangle"/>
+          </a:ln>
+        </p:spPr>
+        <p:style>
+          <a:lnRef idx="1">
+            <a:schemeClr val="accent1"/>
+          </a:lnRef>
+          <a:fillRef idx="0">
+            <a:schemeClr val="accent1"/>
+          </a:fillRef>
+          <a:effectRef idx="0">
+            <a:schemeClr val="accent1"/>
+          </a:effectRef>
+          <a:fontRef idx="minor">
+            <a:schemeClr val="tx1"/>
+          </a:fontRef>
+        </p:style>
+      </p:cxnSp>
+      <p:sp>
+        <p:nvSpPr>
+          <p:cNvPr id="40" name="Rounded Rectangle 39">
+            <a:extLst>
+              <a:ext uri="{FF2B5EF4-FFF2-40B4-BE49-F238E27FC236}">
+                <a16:creationId xmlns:a16="http://schemas.microsoft.com/office/drawing/2014/main" id="{556B9274-7C3E-2B4D-BAF8-83B2025CEAA2}"/>
+              </a:ext>
+            </a:extLst>
+          </p:cNvPr>
+          <p:cNvSpPr/>
+          <p:nvPr/>
+        </p:nvSpPr>
+        <p:spPr>
+          <a:xfrm>
+            <a:off x="4900538" y="2958942"/>
+            <a:ext cx="1790295" cy="365259"/>
+          </a:xfrm>
+          <a:prstGeom prst="roundRect">
+            <a:avLst/>
+          </a:prstGeom>
+          <a:ln w="12700"/>
+        </p:spPr>
+        <p:style>
+          <a:lnRef idx="2">
+            <a:schemeClr val="dk1"/>
+          </a:lnRef>
+          <a:fillRef idx="1">
+            <a:schemeClr val="lt1"/>
+          </a:fillRef>
+          <a:effectRef idx="0">
+            <a:schemeClr val="dk1"/>
+          </a:effectRef>
+          <a:fontRef idx="minor">
+            <a:schemeClr val="dk1"/>
+          </a:fontRef>
+        </p:style>
+        <p:txBody>
+          <a:bodyPr rtlCol="0" anchor="ctr"/>
+          <a:lstStyle/>
+          <a:p>
+            <a:pPr algn="ctr"/>
+            <a:r>
+              <a:rPr lang="en-US" sz="1200" dirty="0"/>
+              <a:t>Fragment length distribution</a:t>
+            </a:r>
+          </a:p>
+        </p:txBody>
+      </p:sp>
+      <p:sp>
+        <p:nvSpPr>
+          <p:cNvPr id="41" name="Rounded Rectangle 40">
+            <a:extLst>
+              <a:ext uri="{FF2B5EF4-FFF2-40B4-BE49-F238E27FC236}">
+                <a16:creationId xmlns:a16="http://schemas.microsoft.com/office/drawing/2014/main" id="{6717D7D3-1822-BE4D-A50D-348F6F15C7E5}"/>
+              </a:ext>
+            </a:extLst>
+          </p:cNvPr>
+          <p:cNvSpPr/>
+          <p:nvPr/>
+        </p:nvSpPr>
+        <p:spPr>
+          <a:xfrm>
+            <a:off x="4900538" y="3462111"/>
+            <a:ext cx="1790295" cy="365259"/>
+          </a:xfrm>
+          <a:prstGeom prst="roundRect">
+            <a:avLst/>
+          </a:prstGeom>
+          <a:ln w="12700"/>
+        </p:spPr>
+        <p:style>
+          <a:lnRef idx="2">
+            <a:schemeClr val="dk1"/>
+          </a:lnRef>
+          <a:fillRef idx="1">
+            <a:schemeClr val="lt1"/>
+          </a:fillRef>
+          <a:effectRef idx="0">
+            <a:schemeClr val="dk1"/>
+          </a:effectRef>
+          <a:fontRef idx="minor">
+            <a:schemeClr val="dk1"/>
+          </a:fontRef>
+        </p:style>
+        <p:txBody>
+          <a:bodyPr rtlCol="0" anchor="ctr"/>
+          <a:lstStyle/>
+          <a:p>
+            <a:pPr algn="ctr"/>
+            <a:r>
+              <a:rPr lang="en-US" sz="1200" dirty="0"/>
+              <a:t>K-mer frequency</a:t>
+            </a:r>
+          </a:p>
+        </p:txBody>
+      </p:sp>
+      <p:sp>
+        <p:nvSpPr>
+          <p:cNvPr id="42" name="Rounded Rectangle 41">
+            <a:extLst>
+              <a:ext uri="{FF2B5EF4-FFF2-40B4-BE49-F238E27FC236}">
+                <a16:creationId xmlns:a16="http://schemas.microsoft.com/office/drawing/2014/main" id="{2B5430D3-E119-9F4D-AA05-69D5E125DC5F}"/>
+              </a:ext>
+            </a:extLst>
+          </p:cNvPr>
+          <p:cNvSpPr/>
+          <p:nvPr/>
+        </p:nvSpPr>
+        <p:spPr>
+          <a:xfrm>
+            <a:off x="4900538" y="3947740"/>
+            <a:ext cx="1790295" cy="365259"/>
+          </a:xfrm>
+          <a:prstGeom prst="roundRect">
+            <a:avLst/>
+          </a:prstGeom>
+          <a:ln w="12700"/>
+        </p:spPr>
+        <p:style>
+          <a:lnRef idx="2">
+            <a:schemeClr val="dk1"/>
+          </a:lnRef>
+          <a:fillRef idx="1">
+            <a:schemeClr val="lt1"/>
+          </a:fillRef>
+          <a:effectRef idx="0">
+            <a:schemeClr val="dk1"/>
+          </a:effectRef>
+          <a:fontRef idx="minor">
+            <a:schemeClr val="dk1"/>
+          </a:fontRef>
+        </p:style>
+        <p:txBody>
+          <a:bodyPr rtlCol="0" anchor="ctr"/>
+          <a:lstStyle/>
+          <a:p>
+            <a:pPr algn="ctr"/>
+            <a:r>
+              <a:rPr lang="en-US" sz="1200" dirty="0"/>
+              <a:t>Homer tag directories</a:t>
+            </a:r>
+          </a:p>
+        </p:txBody>
+      </p:sp>
+      <p:sp>
+        <p:nvSpPr>
+          <p:cNvPr id="45" name="Rounded Rectangle 44">
+            <a:extLst>
+              <a:ext uri="{FF2B5EF4-FFF2-40B4-BE49-F238E27FC236}">
+                <a16:creationId xmlns:a16="http://schemas.microsoft.com/office/drawing/2014/main" id="{E5414DB8-4E5B-EA46-B800-9B24A1566670}"/>
+              </a:ext>
+            </a:extLst>
+          </p:cNvPr>
+          <p:cNvSpPr/>
+          <p:nvPr/>
+        </p:nvSpPr>
+        <p:spPr>
+          <a:xfrm>
+            <a:off x="6904230" y="3947739"/>
+            <a:ext cx="1790295" cy="365259"/>
+          </a:xfrm>
+          <a:prstGeom prst="roundRect">
+            <a:avLst/>
+          </a:prstGeom>
+          <a:ln w="12700"/>
+        </p:spPr>
+        <p:style>
+          <a:lnRef idx="2">
+            <a:schemeClr val="dk1"/>
+          </a:lnRef>
+          <a:fillRef idx="1">
+            <a:schemeClr val="lt1"/>
+          </a:fillRef>
+          <a:effectRef idx="0">
+            <a:schemeClr val="dk1"/>
+          </a:effectRef>
+          <a:fontRef idx="minor">
+            <a:schemeClr val="dk1"/>
+          </a:fontRef>
+        </p:style>
+        <p:txBody>
+          <a:bodyPr rtlCol="0" anchor="ctr"/>
+          <a:lstStyle/>
+          <a:p>
+            <a:pPr algn="ctr"/>
+            <a:r>
+              <a:rPr lang="en-US" sz="1200" dirty="0"/>
+              <a:t>Homer peak calling</a:t>
+            </a:r>
+          </a:p>
+        </p:txBody>
+      </p:sp>
+      <p:sp>
+        <p:nvSpPr>
+          <p:cNvPr id="46" name="Rounded Rectangle 45">
+            <a:extLst>
+              <a:ext uri="{FF2B5EF4-FFF2-40B4-BE49-F238E27FC236}">
+                <a16:creationId xmlns:a16="http://schemas.microsoft.com/office/drawing/2014/main" id="{A19DEB9A-A216-6C44-BA3B-1382C5A0B0F9}"/>
+              </a:ext>
+            </a:extLst>
+          </p:cNvPr>
+          <p:cNvSpPr/>
+          <p:nvPr/>
+        </p:nvSpPr>
+        <p:spPr>
+          <a:xfrm>
+            <a:off x="4900537" y="4443001"/>
+            <a:ext cx="1790295" cy="365259"/>
+          </a:xfrm>
+          <a:prstGeom prst="roundRect">
+            <a:avLst/>
+          </a:prstGeom>
+          <a:ln w="12700"/>
+        </p:spPr>
+        <p:style>
+          <a:lnRef idx="2">
+            <a:schemeClr val="dk1"/>
+          </a:lnRef>
+          <a:fillRef idx="1">
+            <a:schemeClr val="lt1"/>
+          </a:fillRef>
+          <a:effectRef idx="0">
+            <a:schemeClr val="dk1"/>
+          </a:effectRef>
+          <a:fontRef idx="minor">
+            <a:schemeClr val="dk1"/>
+          </a:fontRef>
+        </p:style>
+        <p:txBody>
+          <a:bodyPr rtlCol="0" anchor="ctr"/>
+          <a:lstStyle/>
+          <a:p>
+            <a:pPr algn="ctr"/>
+            <a:r>
+              <a:rPr lang="en-US" sz="1200" dirty="0" err="1"/>
+              <a:t>BigWig</a:t>
+            </a:r>
+            <a:r>
+              <a:rPr lang="en-US" sz="1200" dirty="0"/>
+              <a:t> files from fragments</a:t>
+            </a:r>
+          </a:p>
+        </p:txBody>
+      </p:sp>
+      <p:sp>
+        <p:nvSpPr>
+          <p:cNvPr id="47" name="Rounded Rectangle 46">
+            <a:extLst>
+              <a:ext uri="{FF2B5EF4-FFF2-40B4-BE49-F238E27FC236}">
+                <a16:creationId xmlns:a16="http://schemas.microsoft.com/office/drawing/2014/main" id="{F97BDE05-C7EA-4A4E-81D8-A0C92CAEBFB2}"/>
+              </a:ext>
+            </a:extLst>
+          </p:cNvPr>
+          <p:cNvSpPr/>
+          <p:nvPr/>
+        </p:nvSpPr>
+        <p:spPr>
+          <a:xfrm>
+            <a:off x="4900536" y="5449719"/>
+            <a:ext cx="1790295" cy="365259"/>
+          </a:xfrm>
+          <a:prstGeom prst="roundRect">
+            <a:avLst/>
+          </a:prstGeom>
+          <a:ln w="12700"/>
+        </p:spPr>
+        <p:style>
+          <a:lnRef idx="2">
+            <a:schemeClr val="dk1"/>
+          </a:lnRef>
+          <a:fillRef idx="1">
+            <a:schemeClr val="lt1"/>
+          </a:fillRef>
+          <a:effectRef idx="0">
+            <a:schemeClr val="dk1"/>
+          </a:effectRef>
+          <a:fontRef idx="minor">
+            <a:schemeClr val="dk1"/>
+          </a:fontRef>
+        </p:style>
+        <p:txBody>
+          <a:bodyPr rtlCol="0" anchor="ctr"/>
+          <a:lstStyle/>
+          <a:p>
+            <a:pPr algn="ctr"/>
+            <a:r>
+              <a:rPr lang="en-US" sz="1200" dirty="0"/>
+              <a:t>FCL file (</a:t>
+            </a:r>
+            <a:r>
+              <a:rPr lang="en-US" sz="1200" dirty="0" err="1"/>
+              <a:t>fcl.bed.gz</a:t>
+            </a:r>
+            <a:r>
+              <a:rPr lang="en-US" sz="1200" dirty="0"/>
+              <a:t>)</a:t>
+            </a:r>
+          </a:p>
+        </p:txBody>
+      </p:sp>
+      <p:cxnSp>
+        <p:nvCxnSpPr>
+          <p:cNvPr id="51" name="Elbow Connector 50">
+            <a:extLst>
+              <a:ext uri="{FF2B5EF4-FFF2-40B4-BE49-F238E27FC236}">
+                <a16:creationId xmlns:a16="http://schemas.microsoft.com/office/drawing/2014/main" id="{CF7EA071-CADC-3243-8D19-73781C350622}"/>
+              </a:ext>
+            </a:extLst>
+          </p:cNvPr>
+          <p:cNvCxnSpPr>
+            <a:cxnSpLocks/>
+            <a:stCxn id="12" idx="2"/>
+            <a:endCxn id="41" idx="1"/>
+          </p:cNvCxnSpPr>
+          <p:nvPr/>
+        </p:nvCxnSpPr>
+        <p:spPr>
+          <a:xfrm rot="16200000" flipH="1">
+            <a:off x="4344188" y="3088390"/>
+            <a:ext cx="874617" cy="238084"/>
+          </a:xfrm>
+          <a:prstGeom prst="bentConnector2">
+            <a:avLst/>
+          </a:prstGeom>
+          <a:ln>
+            <a:tailEnd type="triangle"/>
+          </a:ln>
+        </p:spPr>
+        <p:style>
+          <a:lnRef idx="1">
+            <a:schemeClr val="accent1"/>
+          </a:lnRef>
+          <a:fillRef idx="0">
+            <a:schemeClr val="accent1"/>
+          </a:fillRef>
+          <a:effectRef idx="0">
+            <a:schemeClr val="accent1"/>
+          </a:effectRef>
+          <a:fontRef idx="minor">
+            <a:schemeClr val="tx1"/>
+          </a:fontRef>
+        </p:style>
+      </p:cxnSp>
+      <p:cxnSp>
+        <p:nvCxnSpPr>
+          <p:cNvPr id="54" name="Elbow Connector 53">
+            <a:extLst>
+              <a:ext uri="{FF2B5EF4-FFF2-40B4-BE49-F238E27FC236}">
+                <a16:creationId xmlns:a16="http://schemas.microsoft.com/office/drawing/2014/main" id="{A542672C-B143-C348-9C40-E3AE09899B31}"/>
+              </a:ext>
+            </a:extLst>
+          </p:cNvPr>
+          <p:cNvCxnSpPr>
+            <a:cxnSpLocks/>
+            <a:stCxn id="12" idx="2"/>
+            <a:endCxn id="42" idx="1"/>
+          </p:cNvCxnSpPr>
+          <p:nvPr/>
+        </p:nvCxnSpPr>
+        <p:spPr>
+          <a:xfrm rot="16200000" flipH="1">
+            <a:off x="4101373" y="3331205"/>
+            <a:ext cx="1360246" cy="238084"/>
+          </a:xfrm>
+          <a:prstGeom prst="bentConnector2">
+            <a:avLst/>
+          </a:prstGeom>
+          <a:ln>
+            <a:tailEnd type="triangle"/>
+          </a:ln>
+        </p:spPr>
+        <p:style>
+          <a:lnRef idx="1">
+            <a:schemeClr val="accent1"/>
+          </a:lnRef>
+          <a:fillRef idx="0">
+            <a:schemeClr val="accent1"/>
+          </a:fillRef>
+          <a:effectRef idx="0">
+            <a:schemeClr val="accent1"/>
+          </a:effectRef>
+          <a:fontRef idx="minor">
+            <a:schemeClr val="tx1"/>
+          </a:fontRef>
+        </p:style>
+      </p:cxnSp>
+      <p:cxnSp>
+        <p:nvCxnSpPr>
+          <p:cNvPr id="57" name="Elbow Connector 56">
+            <a:extLst>
+              <a:ext uri="{FF2B5EF4-FFF2-40B4-BE49-F238E27FC236}">
+                <a16:creationId xmlns:a16="http://schemas.microsoft.com/office/drawing/2014/main" id="{2AE8E41E-C624-904A-B6F3-461B5E02C9F6}"/>
+              </a:ext>
+            </a:extLst>
+          </p:cNvPr>
+          <p:cNvCxnSpPr>
+            <a:cxnSpLocks/>
+            <a:stCxn id="12" idx="2"/>
+            <a:endCxn id="46" idx="1"/>
+          </p:cNvCxnSpPr>
+          <p:nvPr/>
+        </p:nvCxnSpPr>
+        <p:spPr>
+          <a:xfrm rot="16200000" flipH="1">
+            <a:off x="3853742" y="3578835"/>
+            <a:ext cx="1855507" cy="238083"/>
+          </a:xfrm>
+          <a:prstGeom prst="bentConnector2">
+            <a:avLst/>
+          </a:prstGeom>
+          <a:ln>
+            <a:tailEnd type="triangle"/>
+          </a:ln>
+        </p:spPr>
+        <p:style>
+          <a:lnRef idx="1">
+            <a:schemeClr val="accent1"/>
+          </a:lnRef>
+          <a:fillRef idx="0">
+            <a:schemeClr val="accent1"/>
+          </a:fillRef>
+          <a:effectRef idx="0">
+            <a:schemeClr val="accent1"/>
+          </a:effectRef>
+          <a:fontRef idx="minor">
+            <a:schemeClr val="tx1"/>
+          </a:fontRef>
+        </p:style>
+      </p:cxnSp>
+      <p:cxnSp>
+        <p:nvCxnSpPr>
+          <p:cNvPr id="60" name="Elbow Connector 59">
+            <a:extLst>
+              <a:ext uri="{FF2B5EF4-FFF2-40B4-BE49-F238E27FC236}">
+                <a16:creationId xmlns:a16="http://schemas.microsoft.com/office/drawing/2014/main" id="{7E91A5E6-9CC1-1840-8714-764176AF5D29}"/>
+              </a:ext>
+            </a:extLst>
+          </p:cNvPr>
+          <p:cNvCxnSpPr>
+            <a:cxnSpLocks/>
+            <a:stCxn id="12" idx="2"/>
+            <a:endCxn id="47" idx="1"/>
+          </p:cNvCxnSpPr>
+          <p:nvPr/>
+        </p:nvCxnSpPr>
+        <p:spPr>
+          <a:xfrm rot="16200000" flipH="1">
+            <a:off x="3350383" y="4082195"/>
+            <a:ext cx="2862225" cy="238082"/>
+          </a:xfrm>
+          <a:prstGeom prst="bentConnector2">
+            <a:avLst/>
+          </a:prstGeom>
+          <a:ln>
+            <a:tailEnd type="triangle"/>
+          </a:ln>
+        </p:spPr>
+        <p:style>
+          <a:lnRef idx="1">
+            <a:schemeClr val="accent1"/>
+          </a:lnRef>
+          <a:fillRef idx="0">
+            <a:schemeClr val="accent1"/>
+          </a:fillRef>
+          <a:effectRef idx="0">
+            <a:schemeClr val="accent1"/>
+          </a:effectRef>
+          <a:fontRef idx="minor">
+            <a:schemeClr val="tx1"/>
+          </a:fontRef>
+        </p:style>
+      </p:cxnSp>
+      <p:sp>
+        <p:nvSpPr>
+          <p:cNvPr id="63" name="TextBox 62">
+            <a:extLst>
+              <a:ext uri="{FF2B5EF4-FFF2-40B4-BE49-F238E27FC236}">
+                <a16:creationId xmlns:a16="http://schemas.microsoft.com/office/drawing/2014/main" id="{3B6D663B-A05A-A647-88EA-BC162F5E9E27}"/>
+              </a:ext>
+            </a:extLst>
+          </p:cNvPr>
+          <p:cNvSpPr txBox="1"/>
+          <p:nvPr/>
+        </p:nvSpPr>
+        <p:spPr>
+          <a:xfrm>
+            <a:off x="5770634" y="1898052"/>
+            <a:ext cx="3879845" cy="276999"/>
+          </a:xfrm>
+          <a:prstGeom prst="rect">
+            <a:avLst/>
+          </a:prstGeom>
+          <a:noFill/>
+        </p:spPr>
+        <p:txBody>
+          <a:bodyPr wrap="none" rtlCol="0">
+            <a:spAutoFit/>
+          </a:bodyPr>
+          <a:lstStyle/>
+          <a:p>
+            <a:r>
+              <a:rPr lang="en-US" sz="1200" dirty="0"/>
+              <a:t>*planned to move downstream below fragment generation</a:t>
+            </a:r>
+          </a:p>
+        </p:txBody>
+      </p:sp>
+      <p:cxnSp>
+        <p:nvCxnSpPr>
+          <p:cNvPr id="69" name="Straight Arrow Connector 68">
+            <a:extLst>
+              <a:ext uri="{FF2B5EF4-FFF2-40B4-BE49-F238E27FC236}">
+                <a16:creationId xmlns:a16="http://schemas.microsoft.com/office/drawing/2014/main" id="{DF2E58FF-6012-9741-9011-1CE8A9024EDA}"/>
+              </a:ext>
+            </a:extLst>
+          </p:cNvPr>
+          <p:cNvCxnSpPr>
+            <a:stCxn id="42" idx="3"/>
+            <a:endCxn id="45" idx="1"/>
+          </p:cNvCxnSpPr>
+          <p:nvPr/>
+        </p:nvCxnSpPr>
+        <p:spPr>
+          <a:xfrm flipV="1">
+            <a:off x="6690833" y="4130369"/>
+            <a:ext cx="213397" cy="1"/>
+          </a:xfrm>
+          <a:prstGeom prst="straightConnector1">
+            <a:avLst/>
+          </a:prstGeom>
+          <a:ln>
+            <a:tailEnd type="triangle"/>
+          </a:ln>
+        </p:spPr>
+        <p:style>
+          <a:lnRef idx="1">
+            <a:schemeClr val="accent1"/>
+          </a:lnRef>
+          <a:fillRef idx="0">
+            <a:schemeClr val="accent1"/>
+          </a:fillRef>
+          <a:effectRef idx="0">
+            <a:schemeClr val="accent1"/>
+          </a:effectRef>
+          <a:fontRef idx="minor">
+            <a:schemeClr val="tx1"/>
+          </a:fontRef>
+        </p:style>
+      </p:cxnSp>
+      <p:sp>
+        <p:nvSpPr>
+          <p:cNvPr id="75" name="Rounded Rectangle 74">
+            <a:extLst>
+              <a:ext uri="{FF2B5EF4-FFF2-40B4-BE49-F238E27FC236}">
+                <a16:creationId xmlns:a16="http://schemas.microsoft.com/office/drawing/2014/main" id="{3624C182-8CF6-A14E-9516-33F1AF866548}"/>
+              </a:ext>
+            </a:extLst>
+          </p:cNvPr>
+          <p:cNvSpPr/>
+          <p:nvPr/>
+        </p:nvSpPr>
+        <p:spPr>
+          <a:xfrm>
+            <a:off x="3677791" y="1315764"/>
+            <a:ext cx="7316633" cy="350728"/>
+          </a:xfrm>
+          <a:prstGeom prst="roundRect">
+            <a:avLst/>
+          </a:prstGeom>
+          <a:ln>
+            <a:noFill/>
+          </a:ln>
+        </p:spPr>
+        <p:style>
+          <a:lnRef idx="3">
+            <a:schemeClr val="lt1"/>
+          </a:lnRef>
+          <a:fillRef idx="1">
+            <a:schemeClr val="accent1"/>
+          </a:fillRef>
+          <a:effectRef idx="1">
+            <a:schemeClr val="accent1"/>
+          </a:effectRef>
+          <a:fontRef idx="minor">
+            <a:schemeClr val="lt1"/>
+          </a:fontRef>
+        </p:style>
+        <p:txBody>
+          <a:bodyPr rtlCol="0" anchor="ctr"/>
+          <a:lstStyle/>
+          <a:p>
+            <a:pPr algn="ctr"/>
+            <a:r>
+              <a:rPr lang="en-US" dirty="0"/>
+              <a:t>Processed sample</a:t>
+            </a:r>
+          </a:p>
+        </p:txBody>
+      </p:sp>
+      <p:sp>
+        <p:nvSpPr>
+          <p:cNvPr id="77" name="Rounded Rectangle 76">
+            <a:extLst>
+              <a:ext uri="{FF2B5EF4-FFF2-40B4-BE49-F238E27FC236}">
+                <a16:creationId xmlns:a16="http://schemas.microsoft.com/office/drawing/2014/main" id="{BF8A870D-E4ED-8747-9D01-B8C9EF8D9305}"/>
+              </a:ext>
+            </a:extLst>
+          </p:cNvPr>
+          <p:cNvSpPr/>
+          <p:nvPr/>
+        </p:nvSpPr>
+        <p:spPr>
+          <a:xfrm>
+            <a:off x="4900535" y="4946360"/>
+            <a:ext cx="1790295" cy="365259"/>
+          </a:xfrm>
+          <a:prstGeom prst="roundRect">
+            <a:avLst/>
+          </a:prstGeom>
+          <a:ln w="12700"/>
+        </p:spPr>
+        <p:style>
+          <a:lnRef idx="2">
+            <a:schemeClr val="dk1"/>
+          </a:lnRef>
+          <a:fillRef idx="1">
+            <a:schemeClr val="lt1"/>
+          </a:fillRef>
+          <a:effectRef idx="0">
+            <a:schemeClr val="dk1"/>
+          </a:effectRef>
+          <a:fontRef idx="minor">
+            <a:schemeClr val="dk1"/>
+          </a:fontRef>
+        </p:style>
+        <p:txBody>
+          <a:bodyPr rtlCol="0" anchor="ctr"/>
+          <a:lstStyle/>
+          <a:p>
+            <a:pPr algn="ctr"/>
+            <a:r>
+              <a:rPr lang="en-US" sz="1200" dirty="0" err="1"/>
+              <a:t>BigWig</a:t>
+            </a:r>
+            <a:r>
+              <a:rPr lang="en-US" sz="1200" dirty="0"/>
+              <a:t> files from 5’ 1bp</a:t>
+            </a:r>
+          </a:p>
+        </p:txBody>
+      </p:sp>
+      <p:cxnSp>
+        <p:nvCxnSpPr>
+          <p:cNvPr id="79" name="Elbow Connector 78">
+            <a:extLst>
+              <a:ext uri="{FF2B5EF4-FFF2-40B4-BE49-F238E27FC236}">
+                <a16:creationId xmlns:a16="http://schemas.microsoft.com/office/drawing/2014/main" id="{BBF09D12-5FE0-C64C-B528-23B6FE23761B}"/>
+              </a:ext>
+            </a:extLst>
+          </p:cNvPr>
+          <p:cNvCxnSpPr>
+            <a:cxnSpLocks/>
+            <a:stCxn id="12" idx="2"/>
+            <a:endCxn id="77" idx="1"/>
+          </p:cNvCxnSpPr>
+          <p:nvPr/>
+        </p:nvCxnSpPr>
+        <p:spPr>
+          <a:xfrm rot="16200000" flipH="1">
+            <a:off x="3602061" y="3830516"/>
+            <a:ext cx="2358866" cy="238081"/>
+          </a:xfrm>
+          <a:prstGeom prst="bentConnector2">
+            <a:avLst/>
+          </a:prstGeom>
+          <a:ln>
+            <a:tailEnd type="triangle"/>
+          </a:ln>
+        </p:spPr>
+        <p:style>
+          <a:lnRef idx="1">
+            <a:schemeClr val="accent1"/>
+          </a:lnRef>
+          <a:fillRef idx="0">
+            <a:schemeClr val="accent1"/>
+          </a:fillRef>
+          <a:effectRef idx="0">
+            <a:schemeClr val="accent1"/>
+          </a:effectRef>
+          <a:fontRef idx="minor">
+            <a:schemeClr val="tx1"/>
+          </a:fontRef>
+        </p:style>
+      </p:cxnSp>
+      <p:cxnSp>
+        <p:nvCxnSpPr>
+          <p:cNvPr id="91" name="Elbow Connector 90">
+            <a:extLst>
+              <a:ext uri="{FF2B5EF4-FFF2-40B4-BE49-F238E27FC236}">
+                <a16:creationId xmlns:a16="http://schemas.microsoft.com/office/drawing/2014/main" id="{77B71131-436D-B74E-B90E-E1ACA750E794}"/>
+              </a:ext>
+            </a:extLst>
+          </p:cNvPr>
+          <p:cNvCxnSpPr>
+            <a:cxnSpLocks/>
+            <a:stCxn id="12" idx="2"/>
+            <a:endCxn id="40" idx="1"/>
+          </p:cNvCxnSpPr>
+          <p:nvPr/>
+        </p:nvCxnSpPr>
+        <p:spPr>
+          <a:xfrm rot="16200000" flipH="1">
+            <a:off x="4595772" y="2836806"/>
+            <a:ext cx="371448" cy="238084"/>
+          </a:xfrm>
+          <a:prstGeom prst="bentConnector2">
+            <a:avLst/>
+          </a:prstGeom>
+          <a:ln>
+            <a:tailEnd type="triangle"/>
+          </a:ln>
+        </p:spPr>
+        <p:style>
+          <a:lnRef idx="1">
+            <a:schemeClr val="accent1"/>
+          </a:lnRef>
+          <a:fillRef idx="0">
+            <a:schemeClr val="accent1"/>
+          </a:fillRef>
+          <a:effectRef idx="0">
+            <a:schemeClr val="accent1"/>
+          </a:effectRef>
+          <a:fontRef idx="minor">
+            <a:schemeClr val="tx1"/>
+          </a:fontRef>
+        </p:style>
+      </p:cxnSp>
+      <p:sp>
+        <p:nvSpPr>
+          <p:cNvPr id="96" name="Rounded Rectangle 95">
+            <a:extLst>
+              <a:ext uri="{FF2B5EF4-FFF2-40B4-BE49-F238E27FC236}">
+                <a16:creationId xmlns:a16="http://schemas.microsoft.com/office/drawing/2014/main" id="{18EEE553-B81B-5B4C-87FA-B2F3F90D9852}"/>
+              </a:ext>
+            </a:extLst>
+          </p:cNvPr>
+          <p:cNvSpPr/>
+          <p:nvPr/>
+        </p:nvSpPr>
+        <p:spPr>
+          <a:xfrm>
+            <a:off x="8895396" y="3947739"/>
+            <a:ext cx="1790295" cy="365259"/>
+          </a:xfrm>
+          <a:prstGeom prst="roundRect">
+            <a:avLst/>
+          </a:prstGeom>
+          <a:ln w="12700"/>
+        </p:spPr>
+        <p:style>
+          <a:lnRef idx="2">
+            <a:schemeClr val="dk1"/>
+          </a:lnRef>
+          <a:fillRef idx="1">
+            <a:schemeClr val="lt1"/>
+          </a:fillRef>
+          <a:effectRef idx="0">
+            <a:schemeClr val="dk1"/>
+          </a:effectRef>
+          <a:fontRef idx="minor">
+            <a:schemeClr val="dk1"/>
+          </a:fontRef>
+        </p:style>
+        <p:txBody>
+          <a:bodyPr rtlCol="0" anchor="ctr"/>
+          <a:lstStyle/>
+          <a:p>
+            <a:pPr algn="ctr"/>
+            <a:r>
+              <a:rPr lang="en-US" sz="1200" dirty="0"/>
+              <a:t>Motif search</a:t>
+            </a:r>
+          </a:p>
+        </p:txBody>
+      </p:sp>
+      <p:cxnSp>
+        <p:nvCxnSpPr>
+          <p:cNvPr id="97" name="Straight Arrow Connector 96">
+            <a:extLst>
+              <a:ext uri="{FF2B5EF4-FFF2-40B4-BE49-F238E27FC236}">
+                <a16:creationId xmlns:a16="http://schemas.microsoft.com/office/drawing/2014/main" id="{DAB91A14-AD05-BE47-BB61-4CAC296AC671}"/>
+              </a:ext>
+            </a:extLst>
+          </p:cNvPr>
+          <p:cNvCxnSpPr>
+            <a:cxnSpLocks/>
+            <a:stCxn id="45" idx="3"/>
+            <a:endCxn id="96" idx="1"/>
+          </p:cNvCxnSpPr>
+          <p:nvPr/>
+        </p:nvCxnSpPr>
+        <p:spPr>
+          <a:xfrm>
+            <a:off x="8694525" y="4130369"/>
+            <a:ext cx="200871" cy="0"/>
+          </a:xfrm>
+          <a:prstGeom prst="straightConnector1">
+            <a:avLst/>
+          </a:prstGeom>
+          <a:ln>
+            <a:tailEnd type="triangle"/>
+          </a:ln>
+        </p:spPr>
+        <p:style>
+          <a:lnRef idx="1">
+            <a:schemeClr val="accent1"/>
+          </a:lnRef>
+          <a:fillRef idx="0">
+            <a:schemeClr val="accent1"/>
+          </a:fillRef>
+          <a:effectRef idx="0">
+            <a:schemeClr val="accent1"/>
+          </a:effectRef>
+          <a:fontRef idx="minor">
+            <a:schemeClr val="tx1"/>
+          </a:fontRef>
+        </p:style>
+      </p:cxnSp>
+      <p:sp>
+        <p:nvSpPr>
+          <p:cNvPr id="101" name="Rounded Rectangle 100">
+            <a:extLst>
+              <a:ext uri="{FF2B5EF4-FFF2-40B4-BE49-F238E27FC236}">
+                <a16:creationId xmlns:a16="http://schemas.microsoft.com/office/drawing/2014/main" id="{854C52C9-B94F-EC4A-B031-12E4A82CF728}"/>
+              </a:ext>
+            </a:extLst>
+          </p:cNvPr>
+          <p:cNvSpPr/>
+          <p:nvPr/>
+        </p:nvSpPr>
+        <p:spPr>
+          <a:xfrm>
+            <a:off x="6904230" y="4452001"/>
+            <a:ext cx="1790295" cy="365259"/>
+          </a:xfrm>
+          <a:prstGeom prst="roundRect">
+            <a:avLst/>
+          </a:prstGeom>
+          <a:ln w="12700"/>
+        </p:spPr>
+        <p:style>
+          <a:lnRef idx="2">
+            <a:schemeClr val="dk1"/>
+          </a:lnRef>
+          <a:fillRef idx="1">
+            <a:schemeClr val="lt1"/>
+          </a:fillRef>
+          <a:effectRef idx="0">
+            <a:schemeClr val="dk1"/>
+          </a:effectRef>
+          <a:fontRef idx="minor">
+            <a:schemeClr val="dk1"/>
+          </a:fontRef>
+        </p:style>
+        <p:txBody>
+          <a:bodyPr rtlCol="0" anchor="ctr"/>
+          <a:lstStyle/>
+          <a:p>
+            <a:pPr algn="ctr"/>
+            <a:r>
+              <a:rPr lang="en-US" sz="1200" dirty="0"/>
+              <a:t>Peak visualization</a:t>
+            </a:r>
+          </a:p>
+        </p:txBody>
+      </p:sp>
+      <p:cxnSp>
+        <p:nvCxnSpPr>
+          <p:cNvPr id="102" name="Straight Arrow Connector 101">
+            <a:extLst>
+              <a:ext uri="{FF2B5EF4-FFF2-40B4-BE49-F238E27FC236}">
+                <a16:creationId xmlns:a16="http://schemas.microsoft.com/office/drawing/2014/main" id="{721896C8-6D35-124A-B772-D82E1760801D}"/>
+              </a:ext>
+            </a:extLst>
+          </p:cNvPr>
+          <p:cNvCxnSpPr>
+            <a:cxnSpLocks/>
+            <a:stCxn id="46" idx="3"/>
+            <a:endCxn id="101" idx="1"/>
+          </p:cNvCxnSpPr>
+          <p:nvPr/>
+        </p:nvCxnSpPr>
+        <p:spPr>
+          <a:xfrm>
+            <a:off x="6690832" y="4625631"/>
+            <a:ext cx="213398" cy="9000"/>
+          </a:xfrm>
+          <a:prstGeom prst="straightConnector1">
+            <a:avLst/>
+          </a:prstGeom>
+          <a:ln>
+            <a:tailEnd type="triangle"/>
+          </a:ln>
+        </p:spPr>
+        <p:style>
+          <a:lnRef idx="1">
+            <a:schemeClr val="accent1"/>
+          </a:lnRef>
+          <a:fillRef idx="0">
+            <a:schemeClr val="accent1"/>
+          </a:fillRef>
+          <a:effectRef idx="0">
+            <a:schemeClr val="accent1"/>
+          </a:effectRef>
+          <a:fontRef idx="minor">
+            <a:schemeClr val="tx1"/>
+          </a:fontRef>
+        </p:style>
+      </p:cxnSp>
+      <p:sp>
+        <p:nvSpPr>
+          <p:cNvPr id="105" name="Rounded Rectangle 104">
+            <a:extLst>
+              <a:ext uri="{FF2B5EF4-FFF2-40B4-BE49-F238E27FC236}">
+                <a16:creationId xmlns:a16="http://schemas.microsoft.com/office/drawing/2014/main" id="{E061059A-9C59-E543-B0E7-6329E292E1DE}"/>
+              </a:ext>
+            </a:extLst>
+          </p:cNvPr>
+          <p:cNvSpPr/>
+          <p:nvPr/>
+        </p:nvSpPr>
+        <p:spPr>
+          <a:xfrm>
+            <a:off x="8895395" y="4947525"/>
+            <a:ext cx="1790295" cy="365259"/>
+          </a:xfrm>
+          <a:prstGeom prst="roundRect">
+            <a:avLst/>
+          </a:prstGeom>
+          <a:ln/>
+        </p:spPr>
+        <p:style>
+          <a:lnRef idx="2">
+            <a:schemeClr val="accent2">
+              <a:shade val="50000"/>
+            </a:schemeClr>
+          </a:lnRef>
+          <a:fillRef idx="1">
+            <a:schemeClr val="accent2"/>
+          </a:fillRef>
+          <a:effectRef idx="0">
+            <a:schemeClr val="accent2"/>
+          </a:effectRef>
+          <a:fontRef idx="minor">
+            <a:schemeClr val="lt1"/>
+          </a:fontRef>
+        </p:style>
+        <p:txBody>
+          <a:bodyPr rtlCol="0" anchor="ctr"/>
+          <a:lstStyle/>
+          <a:p>
+            <a:pPr algn="ctr"/>
+            <a:r>
+              <a:rPr lang="en-US" sz="1200" b="1" dirty="0"/>
+              <a:t>Footprint analysis</a:t>
+            </a:r>
+          </a:p>
+        </p:txBody>
+      </p:sp>
+      <p:cxnSp>
+        <p:nvCxnSpPr>
+          <p:cNvPr id="106" name="Straight Arrow Connector 105">
+            <a:extLst>
+              <a:ext uri="{FF2B5EF4-FFF2-40B4-BE49-F238E27FC236}">
+                <a16:creationId xmlns:a16="http://schemas.microsoft.com/office/drawing/2014/main" id="{F78FD154-0F81-F74B-8C6D-2D46E1DB1B08}"/>
+              </a:ext>
+            </a:extLst>
+          </p:cNvPr>
+          <p:cNvCxnSpPr>
+            <a:cxnSpLocks/>
+            <a:stCxn id="77" idx="3"/>
+            <a:endCxn id="105" idx="1"/>
+          </p:cNvCxnSpPr>
+          <p:nvPr/>
+        </p:nvCxnSpPr>
+        <p:spPr>
+          <a:xfrm>
+            <a:off x="6690830" y="5128990"/>
+            <a:ext cx="2204565" cy="1165"/>
+          </a:xfrm>
+          <a:prstGeom prst="straightConnector1">
+            <a:avLst/>
+          </a:prstGeom>
+          <a:ln>
+            <a:tailEnd type="triangle"/>
+          </a:ln>
+        </p:spPr>
+        <p:style>
+          <a:lnRef idx="1">
+            <a:schemeClr val="accent1"/>
+          </a:lnRef>
+          <a:fillRef idx="0">
+            <a:schemeClr val="accent1"/>
+          </a:fillRef>
+          <a:effectRef idx="0">
+            <a:schemeClr val="accent1"/>
+          </a:effectRef>
+          <a:fontRef idx="minor">
+            <a:schemeClr val="tx1"/>
+          </a:fontRef>
+        </p:style>
+      </p:cxnSp>
+      <p:cxnSp>
+        <p:nvCxnSpPr>
+          <p:cNvPr id="112" name="Straight Arrow Connector 111">
+            <a:extLst>
+              <a:ext uri="{FF2B5EF4-FFF2-40B4-BE49-F238E27FC236}">
+                <a16:creationId xmlns:a16="http://schemas.microsoft.com/office/drawing/2014/main" id="{FA123CDE-843E-C54A-85B5-9CB7E7CE8AB2}"/>
+              </a:ext>
+            </a:extLst>
+          </p:cNvPr>
+          <p:cNvCxnSpPr>
+            <a:cxnSpLocks/>
+            <a:stCxn id="96" idx="2"/>
+            <a:endCxn id="105" idx="0"/>
+          </p:cNvCxnSpPr>
+          <p:nvPr/>
+        </p:nvCxnSpPr>
+        <p:spPr>
+          <a:xfrm flipH="1">
+            <a:off x="9790543" y="4312998"/>
+            <a:ext cx="1" cy="634527"/>
+          </a:xfrm>
+          <a:prstGeom prst="straightConnector1">
+            <a:avLst/>
+          </a:prstGeom>
+          <a:ln>
+            <a:tailEnd type="triangle"/>
+          </a:ln>
+        </p:spPr>
+        <p:style>
+          <a:lnRef idx="1">
+            <a:schemeClr val="accent1"/>
+          </a:lnRef>
+          <a:fillRef idx="0">
+            <a:schemeClr val="accent1"/>
+          </a:fillRef>
+          <a:effectRef idx="0">
+            <a:schemeClr val="accent1"/>
+          </a:effectRef>
+          <a:fontRef idx="minor">
+            <a:schemeClr val="tx1"/>
+          </a:fontRef>
+        </p:style>
+      </p:cxnSp>
+      <p:sp>
+        <p:nvSpPr>
+          <p:cNvPr id="118" name="TextBox 117">
+            <a:extLst>
+              <a:ext uri="{FF2B5EF4-FFF2-40B4-BE49-F238E27FC236}">
+                <a16:creationId xmlns:a16="http://schemas.microsoft.com/office/drawing/2014/main" id="{AA268D84-67B6-AA4C-B829-D087552C512E}"/>
+              </a:ext>
+            </a:extLst>
+          </p:cNvPr>
+          <p:cNvSpPr txBox="1"/>
+          <p:nvPr/>
+        </p:nvSpPr>
+        <p:spPr>
+          <a:xfrm>
+            <a:off x="3866067" y="236585"/>
+            <a:ext cx="4957960" cy="646331"/>
+          </a:xfrm>
+          <a:prstGeom prst="rect">
+            <a:avLst/>
+          </a:prstGeom>
+          <a:noFill/>
+        </p:spPr>
+        <p:txBody>
+          <a:bodyPr wrap="none" rtlCol="0">
+            <a:spAutoFit/>
+          </a:bodyPr>
+          <a:lstStyle/>
+          <a:p>
+            <a:pPr marL="285750" indent="-285750">
+              <a:buFontTx/>
+              <a:buChar char="-"/>
+            </a:pPr>
+            <a:r>
+              <a:rPr lang="en-US" dirty="0"/>
+              <a:t>Bunch of bash and R scripts</a:t>
+            </a:r>
+          </a:p>
+          <a:p>
+            <a:pPr marL="285750" indent="-285750">
+              <a:buFontTx/>
+              <a:buChar char="-"/>
+            </a:pPr>
+            <a:r>
+              <a:rPr lang="en-US" dirty="0"/>
+              <a:t>Snakemake-based automatic parallel processing</a:t>
+            </a:r>
+          </a:p>
+        </p:txBody>
+      </p:sp>
+    </p:spTree>
+    <p:extLst>
+      <p:ext uri="{BB962C8B-B14F-4D97-AF65-F5344CB8AC3E}">
+        <p14:creationId xmlns:p14="http://schemas.microsoft.com/office/powerpoint/2010/main" val="1396112812"/>
       </p:ext>
     </p:extLst>
   </p:cSld>

</xml_diff>